<commit_message>
start adding 20465 assembler project for 2016b including source code
</commit_message>
<xml_diff>
--- a/20277 Database systems/Indexing and Hashing_chapater11.pptx
+++ b/20277 Database systems/Indexing and Hashing_chapater11.pptx
@@ -6,23 +6,25 @@
   </p:sldMasterIdLst>
   <p:sldIdLst>
     <p:sldId id="256" r:id="rId2"/>
-    <p:sldId id="257" r:id="rId3"/>
-    <p:sldId id="258" r:id="rId4"/>
-    <p:sldId id="259" r:id="rId5"/>
-    <p:sldId id="260" r:id="rId6"/>
-    <p:sldId id="261" r:id="rId7"/>
-    <p:sldId id="262" r:id="rId8"/>
-    <p:sldId id="263" r:id="rId9"/>
-    <p:sldId id="264" r:id="rId10"/>
-    <p:sldId id="266" r:id="rId11"/>
-    <p:sldId id="267" r:id="rId12"/>
-    <p:sldId id="268" r:id="rId13"/>
-    <p:sldId id="265" r:id="rId14"/>
-    <p:sldId id="269" r:id="rId15"/>
-    <p:sldId id="270" r:id="rId16"/>
-    <p:sldId id="271" r:id="rId17"/>
-    <p:sldId id="272" r:id="rId18"/>
-    <p:sldId id="274" r:id="rId19"/>
+    <p:sldId id="276" r:id="rId3"/>
+    <p:sldId id="257" r:id="rId4"/>
+    <p:sldId id="258" r:id="rId5"/>
+    <p:sldId id="259" r:id="rId6"/>
+    <p:sldId id="260" r:id="rId7"/>
+    <p:sldId id="261" r:id="rId8"/>
+    <p:sldId id="262" r:id="rId9"/>
+    <p:sldId id="263" r:id="rId10"/>
+    <p:sldId id="264" r:id="rId11"/>
+    <p:sldId id="266" r:id="rId12"/>
+    <p:sldId id="267" r:id="rId13"/>
+    <p:sldId id="268" r:id="rId14"/>
+    <p:sldId id="265" r:id="rId15"/>
+    <p:sldId id="269" r:id="rId16"/>
+    <p:sldId id="270" r:id="rId17"/>
+    <p:sldId id="271" r:id="rId18"/>
+    <p:sldId id="272" r:id="rId19"/>
+    <p:sldId id="274" r:id="rId20"/>
+    <p:sldId id="275" r:id="rId21"/>
   </p:sldIdLst>
   <p:sldSz cx="9144000" cy="6858000" type="screen4x3"/>
   <p:notesSz cx="6858000" cy="9144000"/>
@@ -369,7 +371,7 @@
           <a:p>
             <a:fld id="{6ABEA309-C03E-4F8D-BAF7-AEC4AB179768}" type="datetimeFigureOut">
               <a:rPr lang="en-US" smtClean="0"/>
-              <a:t>5/7/2016</a:t>
+              <a:t>5/13/2016</a:t>
             </a:fld>
             <a:endParaRPr lang="en-US"/>
           </a:p>
@@ -539,7 +541,7 @@
           <a:p>
             <a:fld id="{6ABEA309-C03E-4F8D-BAF7-AEC4AB179768}" type="datetimeFigureOut">
               <a:rPr lang="en-US" smtClean="0"/>
-              <a:t>5/7/2016</a:t>
+              <a:t>5/13/2016</a:t>
             </a:fld>
             <a:endParaRPr lang="en-US"/>
           </a:p>
@@ -719,7 +721,7 @@
           <a:p>
             <a:fld id="{6ABEA309-C03E-4F8D-BAF7-AEC4AB179768}" type="datetimeFigureOut">
               <a:rPr lang="en-US" smtClean="0"/>
-              <a:t>5/7/2016</a:t>
+              <a:t>5/13/2016</a:t>
             </a:fld>
             <a:endParaRPr lang="en-US"/>
           </a:p>
@@ -889,7 +891,7 @@
           <a:p>
             <a:fld id="{6ABEA309-C03E-4F8D-BAF7-AEC4AB179768}" type="datetimeFigureOut">
               <a:rPr lang="en-US" smtClean="0"/>
-              <a:t>5/7/2016</a:t>
+              <a:t>5/13/2016</a:t>
             </a:fld>
             <a:endParaRPr lang="en-US"/>
           </a:p>
@@ -1135,7 +1137,7 @@
           <a:p>
             <a:fld id="{6ABEA309-C03E-4F8D-BAF7-AEC4AB179768}" type="datetimeFigureOut">
               <a:rPr lang="en-US" smtClean="0"/>
-              <a:t>5/7/2016</a:t>
+              <a:t>5/13/2016</a:t>
             </a:fld>
             <a:endParaRPr lang="en-US"/>
           </a:p>
@@ -1423,7 +1425,7 @@
           <a:p>
             <a:fld id="{6ABEA309-C03E-4F8D-BAF7-AEC4AB179768}" type="datetimeFigureOut">
               <a:rPr lang="en-US" smtClean="0"/>
-              <a:t>5/7/2016</a:t>
+              <a:t>5/13/2016</a:t>
             </a:fld>
             <a:endParaRPr lang="en-US"/>
           </a:p>
@@ -1845,7 +1847,7 @@
           <a:p>
             <a:fld id="{6ABEA309-C03E-4F8D-BAF7-AEC4AB179768}" type="datetimeFigureOut">
               <a:rPr lang="en-US" smtClean="0"/>
-              <a:t>5/7/2016</a:t>
+              <a:t>5/13/2016</a:t>
             </a:fld>
             <a:endParaRPr lang="en-US"/>
           </a:p>
@@ -1963,7 +1965,7 @@
           <a:p>
             <a:fld id="{6ABEA309-C03E-4F8D-BAF7-AEC4AB179768}" type="datetimeFigureOut">
               <a:rPr lang="en-US" smtClean="0"/>
-              <a:t>5/7/2016</a:t>
+              <a:t>5/13/2016</a:t>
             </a:fld>
             <a:endParaRPr lang="en-US"/>
           </a:p>
@@ -2058,7 +2060,7 @@
           <a:p>
             <a:fld id="{6ABEA309-C03E-4F8D-BAF7-AEC4AB179768}" type="datetimeFigureOut">
               <a:rPr lang="en-US" smtClean="0"/>
-              <a:t>5/7/2016</a:t>
+              <a:t>5/13/2016</a:t>
             </a:fld>
             <a:endParaRPr lang="en-US"/>
           </a:p>
@@ -2335,7 +2337,7 @@
           <a:p>
             <a:fld id="{6ABEA309-C03E-4F8D-BAF7-AEC4AB179768}" type="datetimeFigureOut">
               <a:rPr lang="en-US" smtClean="0"/>
-              <a:t>5/7/2016</a:t>
+              <a:t>5/13/2016</a:t>
             </a:fld>
             <a:endParaRPr lang="en-US"/>
           </a:p>
@@ -2588,7 +2590,7 @@
           <a:p>
             <a:fld id="{6ABEA309-C03E-4F8D-BAF7-AEC4AB179768}" type="datetimeFigureOut">
               <a:rPr lang="en-US" smtClean="0"/>
-              <a:t>5/7/2016</a:t>
+              <a:t>5/13/2016</a:t>
             </a:fld>
             <a:endParaRPr lang="en-US"/>
           </a:p>
@@ -2801,7 +2803,7 @@
           <a:p>
             <a:fld id="{6ABEA309-C03E-4F8D-BAF7-AEC4AB179768}" type="datetimeFigureOut">
               <a:rPr lang="en-US" smtClean="0"/>
-              <a:t>5/7/2016</a:t>
+              <a:t>5/13/2016</a:t>
             </a:fld>
             <a:endParaRPr lang="en-US"/>
           </a:p>
@@ -3278,6 +3280,290 @@
         </p:nvSpPr>
         <p:spPr/>
         <p:txBody>
+          <a:bodyPr/>
+          <a:lstStyle/>
+          <a:p>
+            <a:r>
+              <a:rPr lang="en-US" dirty="0" smtClean="0"/>
+              <a:t>11.3 B+-Tree Index Files</a:t>
+            </a:r>
+            <a:endParaRPr lang="en-US" dirty="0"/>
+          </a:p>
+        </p:txBody>
+      </p:sp>
+      <p:sp>
+        <p:nvSpPr>
+          <p:cNvPr id="3" name="Content Placeholder 2"/>
+          <p:cNvSpPr>
+            <a:spLocks noGrp="1"/>
+          </p:cNvSpPr>
+          <p:nvPr>
+            <p:ph idx="1"/>
+          </p:nvPr>
+        </p:nvSpPr>
+        <p:spPr/>
+        <p:txBody>
+          <a:bodyPr>
+            <a:normAutofit/>
+          </a:bodyPr>
+          <a:lstStyle/>
+          <a:p>
+            <a:pPr algn="r" rtl="1"/>
+            <a:r>
+              <a:rPr lang="he-IL" sz="1600" dirty="0" smtClean="0"/>
+              <a:t>החסרון של </a:t>
+            </a:r>
+            <a:r>
+              <a:rPr lang="en-US" sz="1600" dirty="0" smtClean="0"/>
+              <a:t>index-sequential file </a:t>
+            </a:r>
+            <a:r>
+              <a:rPr lang="he-IL" sz="1600" dirty="0" smtClean="0"/>
+              <a:t> הוא שככל ה</a:t>
+            </a:r>
+            <a:r>
+              <a:rPr lang="en-US" sz="1600" dirty="0" smtClean="0"/>
+              <a:t>data </a:t>
+            </a:r>
+            <a:r>
+              <a:rPr lang="he-IL" sz="1600" dirty="0" smtClean="0"/>
+              <a:t> גדול יותר הביצוע לשאילתה חזרה איטי יותר</a:t>
+            </a:r>
+          </a:p>
+          <a:p>
+            <a:pPr algn="r" rtl="1"/>
+            <a:r>
+              <a:rPr lang="he-IL" sz="1600" dirty="0" smtClean="0"/>
+              <a:t> </a:t>
+            </a:r>
+            <a:r>
+              <a:rPr lang="en-US" sz="1600" dirty="0" smtClean="0">
+                <a:solidFill>
+                  <a:srgbClr val="00B0F0"/>
+                </a:solidFill>
+              </a:rPr>
+              <a:t>B+-tree </a:t>
+            </a:r>
+            <a:r>
+              <a:rPr lang="en-US" sz="1600" dirty="0" smtClean="0"/>
+              <a:t>index structure</a:t>
+            </a:r>
+            <a:r>
+              <a:rPr lang="he-IL" sz="1600" dirty="0" smtClean="0"/>
+              <a:t> הוא הנפוץ ביותר (</a:t>
+            </a:r>
+            <a:r>
+              <a:rPr lang="en-US" sz="1600" dirty="0" smtClean="0"/>
+              <a:t> balance search tree</a:t>
+            </a:r>
+            <a:r>
+              <a:rPr lang="he-IL" sz="1600" dirty="0" smtClean="0"/>
+              <a:t>)</a:t>
+            </a:r>
+          </a:p>
+          <a:p>
+            <a:pPr algn="r" rtl="1"/>
+            <a:r>
+              <a:rPr lang="en-US" sz="1600" dirty="0" smtClean="0"/>
+              <a:t>Good place to see quick tutorial on balance search tree is you tube</a:t>
+            </a:r>
+          </a:p>
+          <a:p>
+            <a:pPr algn="r" rtl="1"/>
+            <a:r>
+              <a:rPr lang="en-US" sz="1050" dirty="0" smtClean="0">
+                <a:hlinkClick r:id="rId2"/>
+              </a:rPr>
+              <a:t>https://www.youtube.com/watch?v=R1w_kICRI3g</a:t>
+            </a:r>
+            <a:r>
+              <a:rPr lang="he-IL" sz="1050" dirty="0"/>
+              <a:t> </a:t>
+            </a:r>
+            <a:r>
+              <a:rPr lang="he-IL" sz="1050" dirty="0" smtClean="0"/>
+              <a:t>, </a:t>
+            </a:r>
+            <a:r>
+              <a:rPr lang="en-US" sz="1050" dirty="0" smtClean="0">
+                <a:hlinkClick r:id="rId3"/>
+              </a:rPr>
+              <a:t>https://www.youtube.com/watch?v=RAgCa_IDCNQ</a:t>
+            </a:r>
+            <a:r>
+              <a:rPr lang="he-IL" sz="1050" dirty="0" smtClean="0"/>
+              <a:t> , </a:t>
+            </a:r>
+          </a:p>
+          <a:p>
+            <a:pPr algn="l"/>
+            <a:r>
+              <a:rPr lang="en-US" sz="1600" dirty="0" smtClean="0"/>
+              <a:t>Within </a:t>
+            </a:r>
+            <a:r>
+              <a:rPr lang="en-US" sz="1600" dirty="0"/>
+              <a:t>a </a:t>
+            </a:r>
+            <a:r>
+              <a:rPr lang="en-US" sz="1600" dirty="0" err="1"/>
+              <a:t>B+tree</a:t>
+            </a:r>
+            <a:r>
+              <a:rPr lang="en-US" sz="1600" dirty="0"/>
+              <a:t> all leaf nodes are linked together in a linked-listed, left to right, and since the values at the leaf nodes are sorted, so range lookups are very efficient</a:t>
+            </a:r>
+            <a:r>
+              <a:rPr lang="en-US" sz="1600" dirty="0" smtClean="0"/>
+              <a:t>.</a:t>
+            </a:r>
+          </a:p>
+          <a:p>
+            <a:pPr marL="0" indent="0">
+              <a:buNone/>
+            </a:pPr>
+            <a:r>
+              <a:rPr lang="en-US" sz="2000" dirty="0" smtClean="0"/>
+              <a:t> </a:t>
+            </a:r>
+          </a:p>
+          <a:p>
+            <a:r>
+              <a:rPr lang="en-US" sz="2000" dirty="0" smtClean="0"/>
+              <a:t>Each leaf can hold up to n − 1</a:t>
+            </a:r>
+          </a:p>
+          <a:p>
+            <a:r>
+              <a:rPr lang="en-US" sz="2000" dirty="0" smtClean="0"/>
+              <a:t>We allow leaf nodes to contain as few as (n − 1)/2 values.</a:t>
+            </a:r>
+          </a:p>
+          <a:p>
+            <a:pPr marL="0" indent="0">
+              <a:buNone/>
+            </a:pPr>
+            <a:r>
+              <a:rPr lang="en-US" sz="2000" dirty="0" smtClean="0"/>
+              <a:t>   This is how a node looks like, n pointers and n-1 keys</a:t>
+            </a:r>
+          </a:p>
+          <a:p>
+            <a:pPr algn="l"/>
+            <a:endParaRPr lang="he-IL" sz="1050" dirty="0" smtClean="0"/>
+          </a:p>
+          <a:p>
+            <a:pPr algn="r" rtl="1"/>
+            <a:endParaRPr lang="en-US" sz="1600" dirty="0"/>
+          </a:p>
+        </p:txBody>
+      </p:sp>
+      <p:pic>
+        <p:nvPicPr>
+          <p:cNvPr id="4" name="Picture 3"/>
+          <p:cNvPicPr>
+            <a:picLocks noChangeAspect="1" noChangeArrowheads="1"/>
+          </p:cNvPicPr>
+          <p:nvPr/>
+        </p:nvPicPr>
+        <p:blipFill>
+          <a:blip r:embed="rId4">
+            <a:extLst>
+              <a:ext uri="{28A0092B-C50C-407E-A947-70E740481C1C}">
+                <a14:useLocalDpi xmlns:a14="http://schemas.microsoft.com/office/drawing/2010/main" val="0"/>
+              </a:ext>
+            </a:extLst>
+          </a:blip>
+          <a:srcRect/>
+          <a:stretch>
+            <a:fillRect/>
+          </a:stretch>
+        </p:blipFill>
+        <p:spPr bwMode="auto">
+          <a:xfrm>
+            <a:off x="457200" y="5029200"/>
+            <a:ext cx="4876800" cy="962025"/>
+          </a:xfrm>
+          <a:prstGeom prst="rect">
+            <a:avLst/>
+          </a:prstGeom>
+          <a:noFill/>
+          <a:ln>
+            <a:noFill/>
+          </a:ln>
+          <a:effectLst/>
+          <a:extLst>
+            <a:ext uri="{909E8E84-426E-40DD-AFC4-6F175D3DCCD1}">
+              <a14:hiddenFill xmlns:a14="http://schemas.microsoft.com/office/drawing/2010/main">
+                <a:solidFill>
+                  <a:schemeClr val="accent1"/>
+                </a:solidFill>
+              </a14:hiddenFill>
+            </a:ext>
+            <a:ext uri="{91240B29-F687-4F45-9708-019B960494DF}">
+              <a14:hiddenLine xmlns:a14="http://schemas.microsoft.com/office/drawing/2010/main" w="9525">
+                <a:solidFill>
+                  <a:schemeClr val="tx1"/>
+                </a:solidFill>
+                <a:miter lim="800000"/>
+                <a:headEnd/>
+                <a:tailEnd/>
+              </a14:hiddenLine>
+            </a:ext>
+            <a:ext uri="{AF507438-7753-43E0-B8FC-AC1667EBCBE1}">
+              <a14:hiddenEffects xmlns:a14="http://schemas.microsoft.com/office/drawing/2010/main">
+                <a:effectLst>
+                  <a:outerShdw dist="35921" dir="2700000" algn="ctr" rotWithShape="0">
+                    <a:schemeClr val="bg2"/>
+                  </a:outerShdw>
+                </a:effectLst>
+              </a14:hiddenEffects>
+            </a:ext>
+          </a:extLst>
+        </p:spPr>
+      </p:pic>
+    </p:spTree>
+    <p:extLst>
+      <p:ext uri="{BB962C8B-B14F-4D97-AF65-F5344CB8AC3E}">
+        <p14:creationId xmlns:p14="http://schemas.microsoft.com/office/powerpoint/2010/main" val="4214298886"/>
+      </p:ext>
+    </p:extLst>
+  </p:cSld>
+  <p:clrMapOvr>
+    <a:masterClrMapping/>
+  </p:clrMapOvr>
+</p:sld>
+</file>
+
+<file path=ppt/slides/slide11.xml><?xml version="1.0" encoding="utf-8"?>
+<p:sld xmlns:a="http://schemas.openxmlformats.org/drawingml/2006/main" xmlns:r="http://schemas.openxmlformats.org/officeDocument/2006/relationships" xmlns:p="http://schemas.openxmlformats.org/presentationml/2006/main">
+  <p:cSld>
+    <p:spTree>
+      <p:nvGrpSpPr>
+        <p:cNvPr id="1" name=""/>
+        <p:cNvGrpSpPr/>
+        <p:nvPr/>
+      </p:nvGrpSpPr>
+      <p:grpSpPr>
+        <a:xfrm>
+          <a:off x="0" y="0"/>
+          <a:ext cx="0" cy="0"/>
+          <a:chOff x="0" y="0"/>
+          <a:chExt cx="0" cy="0"/>
+        </a:xfrm>
+      </p:grpSpPr>
+      <p:sp>
+        <p:nvSpPr>
+          <p:cNvPr id="2" name="Title 1"/>
+          <p:cNvSpPr>
+            <a:spLocks noGrp="1"/>
+          </p:cNvSpPr>
+          <p:nvPr>
+            <p:ph type="title"/>
+          </p:nvPr>
+        </p:nvSpPr>
+        <p:spPr/>
+        <p:txBody>
           <a:bodyPr>
             <a:noAutofit/>
           </a:bodyPr>
@@ -3439,7 +3725,7 @@
 </p:sld>
 </file>
 
-<file path=ppt/slides/slide11.xml><?xml version="1.0" encoding="utf-8"?>
+<file path=ppt/slides/slide12.xml><?xml version="1.0" encoding="utf-8"?>
 <p:sld xmlns:a="http://schemas.openxmlformats.org/drawingml/2006/main" xmlns:r="http://schemas.openxmlformats.org/officeDocument/2006/relationships" xmlns:p="http://schemas.openxmlformats.org/presentationml/2006/main">
   <p:cSld>
     <p:spTree>
@@ -3731,7 +4017,7 @@
 </p:sld>
 </file>
 
-<file path=ppt/slides/slide12.xml><?xml version="1.0" encoding="utf-8"?>
+<file path=ppt/slides/slide13.xml><?xml version="1.0" encoding="utf-8"?>
 <p:sld xmlns:a="http://schemas.openxmlformats.org/drawingml/2006/main" xmlns:r="http://schemas.openxmlformats.org/officeDocument/2006/relationships" xmlns:p="http://schemas.openxmlformats.org/presentationml/2006/main">
   <p:cSld>
     <p:spTree>
@@ -3877,7 +4163,7 @@
 </p:sld>
 </file>
 
-<file path=ppt/slides/slide13.xml><?xml version="1.0" encoding="utf-8"?>
+<file path=ppt/slides/slide14.xml><?xml version="1.0" encoding="utf-8"?>
 <p:sld xmlns:a="http://schemas.openxmlformats.org/drawingml/2006/main" xmlns:r="http://schemas.openxmlformats.org/officeDocument/2006/relationships" xmlns:p="http://schemas.openxmlformats.org/presentationml/2006/main">
   <p:cSld>
     <p:spTree>
@@ -3999,7 +4285,7 @@
 </p:sld>
 </file>
 
-<file path=ppt/slides/slide14.xml><?xml version="1.0" encoding="utf-8"?>
+<file path=ppt/slides/slide15.xml><?xml version="1.0" encoding="utf-8"?>
 <p:sld xmlns:a="http://schemas.openxmlformats.org/drawingml/2006/main" xmlns:r="http://schemas.openxmlformats.org/officeDocument/2006/relationships" xmlns:p="http://schemas.openxmlformats.org/presentationml/2006/main">
   <p:cSld>
     <p:spTree>
@@ -4243,7 +4529,7 @@
 </p:sld>
 </file>
 
-<file path=ppt/slides/slide15.xml><?xml version="1.0" encoding="utf-8"?>
+<file path=ppt/slides/slide16.xml><?xml version="1.0" encoding="utf-8"?>
 <p:sld xmlns:a="http://schemas.openxmlformats.org/drawingml/2006/main" xmlns:r="http://schemas.openxmlformats.org/officeDocument/2006/relationships" xmlns:p="http://schemas.openxmlformats.org/presentationml/2006/main">
   <p:cSld>
     <p:spTree>
@@ -4373,7 +4659,7 @@
 </p:sld>
 </file>
 
-<file path=ppt/slides/slide16.xml><?xml version="1.0" encoding="utf-8"?>
+<file path=ppt/slides/slide17.xml><?xml version="1.0" encoding="utf-8"?>
 <p:sld xmlns:a="http://schemas.openxmlformats.org/drawingml/2006/main" xmlns:r="http://schemas.openxmlformats.org/officeDocument/2006/relationships" xmlns:p="http://schemas.openxmlformats.org/presentationml/2006/main">
   <p:cSld>
     <p:spTree>
@@ -4696,7 +4982,7 @@
 </p:sld>
 </file>
 
-<file path=ppt/slides/slide17.xml><?xml version="1.0" encoding="utf-8"?>
+<file path=ppt/slides/slide18.xml><?xml version="1.0" encoding="utf-8"?>
 <p:sld xmlns:a="http://schemas.openxmlformats.org/drawingml/2006/main" xmlns:r="http://schemas.openxmlformats.org/officeDocument/2006/relationships" xmlns:p="http://schemas.openxmlformats.org/presentationml/2006/main">
   <p:cSld>
     <p:spTree>
@@ -4927,8 +5213,8 @@
           </a:extLst>
         </p:spPr>
       </p:pic>
-      <mc:AlternateContent xmlns:mc="http://schemas.openxmlformats.org/markup-compatibility/2006">
-        <mc:Choice xmlns:p14="http://schemas.microsoft.com/office/powerpoint/2010/main" Requires="p14">
+      <mc:AlternateContent xmlns:mc="http://schemas.openxmlformats.org/markup-compatibility/2006" xmlns:p14="http://schemas.microsoft.com/office/powerpoint/2010/main">
+        <mc:Choice Requires="p14">
           <p:contentPart p14:bwMode="auto" r:id="rId4">
             <p14:nvContentPartPr>
               <p14:cNvPr id="5" name="Ink 4"/>
@@ -4941,7 +5227,7 @@
             </p14:xfrm>
           </p:contentPart>
         </mc:Choice>
-        <mc:Fallback>
+        <mc:Fallback xmlns="">
           <p:pic>
             <p:nvPicPr>
               <p:cNvPr id="5" name="Ink 4"/>
@@ -4966,8 +5252,8 @@
           </p:pic>
         </mc:Fallback>
       </mc:AlternateContent>
-      <mc:AlternateContent xmlns:mc="http://schemas.openxmlformats.org/markup-compatibility/2006">
-        <mc:Choice xmlns:p14="http://schemas.microsoft.com/office/powerpoint/2010/main" Requires="p14">
+      <mc:AlternateContent xmlns:mc="http://schemas.openxmlformats.org/markup-compatibility/2006" xmlns:p14="http://schemas.microsoft.com/office/powerpoint/2010/main">
+        <mc:Choice Requires="p14">
           <p:contentPart p14:bwMode="auto" r:id="rId6">
             <p14:nvContentPartPr>
               <p14:cNvPr id="6" name="Ink 5"/>
@@ -4980,7 +5266,7 @@
             </p14:xfrm>
           </p:contentPart>
         </mc:Choice>
-        <mc:Fallback>
+        <mc:Fallback xmlns="">
           <p:pic>
             <p:nvPicPr>
               <p:cNvPr id="6" name="Ink 5"/>
@@ -5025,7 +5311,7 @@
 </p:sld>
 </file>
 
-<file path=ppt/slides/slide18.xml><?xml version="1.0" encoding="utf-8"?>
+<file path=ppt/slides/slide19.xml><?xml version="1.0" encoding="utf-8"?>
 <p:sld xmlns:a="http://schemas.openxmlformats.org/drawingml/2006/main" xmlns:r="http://schemas.openxmlformats.org/officeDocument/2006/relationships" xmlns:p="http://schemas.openxmlformats.org/presentationml/2006/main">
   <p:cSld>
     <p:spTree>
@@ -5054,20 +5340,95 @@
         </p:nvSpPr>
         <p:spPr/>
         <p:txBody>
-          <a:bodyPr/>
+          <a:bodyPr>
+            <a:normAutofit/>
+          </a:bodyPr>
           <a:lstStyle/>
           <a:p>
             <a:r>
               <a:rPr lang="en-US" dirty="0" smtClean="0"/>
               <a:t>B+ tree insertion</a:t>
             </a:r>
-            <a:endParaRPr lang="en-US" dirty="0"/>
-          </a:p>
-        </p:txBody>
-      </p:sp>
-      <p:sp>
-        <p:nvSpPr>
-          <p:cNvPr id="3" name="Content Placeholder 2"/>
+            <a:br>
+              <a:rPr lang="en-US" dirty="0" smtClean="0"/>
+            </a:br>
+            <a:r>
+              <a:rPr lang="en-US" sz="2200" dirty="0" smtClean="0">
+                <a:hlinkClick r:id="rId2"/>
+              </a:rPr>
+              <a:t>https://www.youtube.com/watch?v=bhKixY-cZHE</a:t>
+            </a:r>
+            <a:endParaRPr lang="en-US" sz="2200" dirty="0"/>
+          </a:p>
+        </p:txBody>
+      </p:sp>
+      <p:pic>
+        <p:nvPicPr>
+          <p:cNvPr id="9221" name="Picture 5"/>
+          <p:cNvPicPr>
+            <a:picLocks noChangeAspect="1" noChangeArrowheads="1"/>
+          </p:cNvPicPr>
+          <p:nvPr/>
+        </p:nvPicPr>
+        <p:blipFill>
+          <a:blip r:embed="rId3">
+            <a:extLst>
+              <a:ext uri="{28A0092B-C50C-407E-A947-70E740481C1C}">
+                <a14:useLocalDpi xmlns:a14="http://schemas.microsoft.com/office/drawing/2010/main" val="0"/>
+              </a:ext>
+            </a:extLst>
+          </a:blip>
+          <a:srcRect/>
+          <a:stretch>
+            <a:fillRect/>
+          </a:stretch>
+        </p:blipFill>
+        <p:spPr bwMode="auto">
+          <a:xfrm>
+            <a:off x="304800" y="2362200"/>
+            <a:ext cx="3753498" cy="2133600"/>
+          </a:xfrm>
+          <a:prstGeom prst="rect">
+            <a:avLst/>
+          </a:prstGeom>
+          <a:noFill/>
+          <a:ln>
+            <a:noFill/>
+          </a:ln>
+          <a:effectLst/>
+          <a:extLst>
+            <a:ext uri="{909E8E84-426E-40DD-AFC4-6F175D3DCCD1}">
+              <a14:hiddenFill xmlns:a14="http://schemas.microsoft.com/office/drawing/2010/main">
+                <a:solidFill>
+                  <a:schemeClr val="accent1"/>
+                </a:solidFill>
+              </a14:hiddenFill>
+            </a:ext>
+            <a:ext uri="{91240B29-F687-4F45-9708-019B960494DF}">
+              <a14:hiddenLine xmlns:a14="http://schemas.microsoft.com/office/drawing/2010/main" w="9525">
+                <a:solidFill>
+                  <a:schemeClr val="tx1"/>
+                </a:solidFill>
+                <a:miter lim="800000"/>
+                <a:headEnd/>
+                <a:tailEnd/>
+              </a14:hiddenLine>
+            </a:ext>
+            <a:ext uri="{AF507438-7753-43E0-B8FC-AC1667EBCBE1}">
+              <a14:hiddenEffects xmlns:a14="http://schemas.microsoft.com/office/drawing/2010/main">
+                <a:effectLst>
+                  <a:outerShdw dist="35921" dir="2700000" algn="ctr" rotWithShape="0">
+                    <a:schemeClr val="bg2"/>
+                  </a:outerShdw>
+                </a:effectLst>
+              </a14:hiddenEffects>
+            </a:ext>
+          </a:extLst>
+        </p:spPr>
+      </p:pic>
+      <p:sp>
+        <p:nvSpPr>
+          <p:cNvPr id="5" name="Content Placeholder 4"/>
           <p:cNvSpPr>
             <a:spLocks noGrp="1"/>
           </p:cNvSpPr>
@@ -5075,12 +5436,7 @@
             <p:ph idx="1"/>
           </p:nvPr>
         </p:nvSpPr>
-        <p:spPr>
-          <a:xfrm>
-            <a:off x="457200" y="1600200"/>
-            <a:ext cx="8229600" cy="4724400"/>
-          </a:xfrm>
-        </p:spPr>
+        <p:spPr/>
         <p:txBody>
           <a:bodyPr/>
           <a:lstStyle/>
@@ -5136,6 +5492,233 @@
           <a:p>
             <a:r>
               <a:rPr lang="he-IL" dirty="0" smtClean="0"/>
+              <a:t>ספר הקורס</a:t>
+            </a:r>
+            <a:endParaRPr lang="en-US" dirty="0"/>
+          </a:p>
+        </p:txBody>
+      </p:sp>
+      <p:sp>
+        <p:nvSpPr>
+          <p:cNvPr id="3" name="Content Placeholder 2"/>
+          <p:cNvSpPr>
+            <a:spLocks noGrp="1"/>
+          </p:cNvSpPr>
+          <p:nvPr>
+            <p:ph idx="1"/>
+          </p:nvPr>
+        </p:nvSpPr>
+        <p:spPr/>
+        <p:txBody>
+          <a:bodyPr/>
+          <a:lstStyle/>
+          <a:p>
+            <a:r>
+              <a:rPr lang="en-US" dirty="0"/>
+              <a:t>A. </a:t>
+            </a:r>
+            <a:r>
+              <a:rPr lang="en-US" dirty="0" err="1"/>
+              <a:t>Silberschatz</a:t>
+            </a:r>
+            <a:r>
+              <a:rPr lang="en-US" dirty="0"/>
+              <a:t>, H.F. </a:t>
+            </a:r>
+            <a:r>
+              <a:rPr lang="en-US" dirty="0" err="1"/>
+              <a:t>Korth</a:t>
+            </a:r>
+            <a:r>
+              <a:rPr lang="en-US" dirty="0"/>
+              <a:t> &amp; S. </a:t>
+            </a:r>
+            <a:r>
+              <a:rPr lang="en-US" dirty="0" err="1"/>
+              <a:t>Sudarshan</a:t>
+            </a:r>
+            <a:r>
+              <a:rPr lang="en-US" dirty="0"/>
+              <a:t>, </a:t>
+            </a:r>
+            <a:r>
+              <a:rPr lang="en-US" i="1" dirty="0"/>
+              <a:t>Database System Concepts</a:t>
+            </a:r>
+            <a:r>
+              <a:rPr lang="en-US" dirty="0"/>
+              <a:t>, 6th ed. (‏﻿McGraw Hill, 2011‎)</a:t>
+            </a:r>
+            <a:r>
+              <a:rPr lang="en-US" dirty="0" smtClean="0"/>
+              <a:t>‏</a:t>
+            </a:r>
+            <a:endParaRPr lang="he-IL" dirty="0" smtClean="0"/>
+          </a:p>
+          <a:p>
+            <a:r>
+              <a:rPr lang="en-US" dirty="0">
+                <a:hlinkClick r:id="rId2"/>
+              </a:rPr>
+              <a:t>https://</a:t>
+            </a:r>
+            <a:r>
+              <a:rPr lang="en-US" dirty="0" smtClean="0">
+                <a:hlinkClick r:id="rId2"/>
+              </a:rPr>
+              <a:t>docs.google.com/file/d/0B-Rb64QiDg8wZXZNSnNQNmVjUkU/edit</a:t>
+            </a:r>
+            <a:endParaRPr lang="he-IL" dirty="0" smtClean="0"/>
+          </a:p>
+          <a:p>
+            <a:pPr algn="r" rtl="1"/>
+            <a:endParaRPr lang="he-IL" dirty="0" smtClean="0"/>
+          </a:p>
+          <a:p>
+            <a:pPr algn="r" rtl="1"/>
+            <a:r>
+              <a:rPr lang="he-IL" sz="1400" dirty="0" smtClean="0"/>
+              <a:t>הערה אישית: ספר מצויין , שמכיל בתוכו כל מה שקשור ל </a:t>
+            </a:r>
+            <a:r>
+              <a:rPr lang="en-US" sz="1400" dirty="0" err="1" smtClean="0"/>
+              <a:t>sql</a:t>
+            </a:r>
+            <a:r>
+              <a:rPr lang="en-US" sz="1400" dirty="0" smtClean="0"/>
+              <a:t> </a:t>
+            </a:r>
+            <a:r>
+              <a:rPr lang="he-IL" sz="1400" dirty="0" smtClean="0"/>
+              <a:t> ו </a:t>
+            </a:r>
+            <a:r>
+              <a:rPr lang="en-US" sz="1400" dirty="0" smtClean="0"/>
+              <a:t> databases </a:t>
+            </a:r>
+            <a:r>
+              <a:rPr lang="he-IL" sz="1400" dirty="0" smtClean="0"/>
+              <a:t> ספר שאפשר לקחת גם שמתחילים לעבוד.  </a:t>
+            </a:r>
+          </a:p>
+          <a:p>
+            <a:pPr algn="r" rtl="1"/>
+            <a:r>
+              <a:rPr lang="he-IL" sz="1400" dirty="0" smtClean="0"/>
+              <a:t>לא לגעת בספר הקורס בעברית – לא מתרגמים משהו מצויין.</a:t>
+            </a:r>
+            <a:endParaRPr lang="en-US" sz="1400" dirty="0"/>
+          </a:p>
+        </p:txBody>
+      </p:sp>
+    </p:spTree>
+    <p:extLst>
+      <p:ext uri="{BB962C8B-B14F-4D97-AF65-F5344CB8AC3E}">
+        <p14:creationId xmlns:p14="http://schemas.microsoft.com/office/powerpoint/2010/main" val="2851290360"/>
+      </p:ext>
+    </p:extLst>
+  </p:cSld>
+  <p:clrMapOvr>
+    <a:masterClrMapping/>
+  </p:clrMapOvr>
+  <p:timing>
+    <p:tnLst>
+      <p:par>
+        <p:cTn id="1" dur="indefinite" restart="never" nodeType="tmRoot"/>
+      </p:par>
+    </p:tnLst>
+  </p:timing>
+</p:sld>
+</file>
+
+<file path=ppt/slides/slide20.xml><?xml version="1.0" encoding="utf-8"?>
+<p:sld xmlns:a="http://schemas.openxmlformats.org/drawingml/2006/main" xmlns:r="http://schemas.openxmlformats.org/officeDocument/2006/relationships" xmlns:p="http://schemas.openxmlformats.org/presentationml/2006/main">
+  <p:cSld>
+    <p:spTree>
+      <p:nvGrpSpPr>
+        <p:cNvPr id="1" name=""/>
+        <p:cNvGrpSpPr/>
+        <p:nvPr/>
+      </p:nvGrpSpPr>
+      <p:grpSpPr>
+        <a:xfrm>
+          <a:off x="0" y="0"/>
+          <a:ext cx="0" cy="0"/>
+          <a:chOff x="0" y="0"/>
+          <a:chExt cx="0" cy="0"/>
+        </a:xfrm>
+      </p:grpSpPr>
+      <p:sp>
+        <p:nvSpPr>
+          <p:cNvPr id="3" name="Content Placeholder 2"/>
+          <p:cNvSpPr>
+            <a:spLocks noGrp="1"/>
+          </p:cNvSpPr>
+          <p:nvPr>
+            <p:ph idx="1"/>
+          </p:nvPr>
+        </p:nvSpPr>
+        <p:spPr>
+          <a:xfrm>
+            <a:off x="457200" y="152400"/>
+            <a:ext cx="8229600" cy="5973763"/>
+          </a:xfrm>
+        </p:spPr>
+        <p:txBody>
+          <a:bodyPr/>
+          <a:lstStyle/>
+          <a:p>
+            <a:endParaRPr lang="en-US" dirty="0"/>
+          </a:p>
+        </p:txBody>
+      </p:sp>
+    </p:spTree>
+    <p:extLst>
+      <p:ext uri="{BB962C8B-B14F-4D97-AF65-F5344CB8AC3E}">
+        <p14:creationId xmlns:p14="http://schemas.microsoft.com/office/powerpoint/2010/main" val="3071731086"/>
+      </p:ext>
+    </p:extLst>
+  </p:cSld>
+  <p:clrMapOvr>
+    <a:masterClrMapping/>
+  </p:clrMapOvr>
+</p:sld>
+</file>
+
+<file path=ppt/slides/slide3.xml><?xml version="1.0" encoding="utf-8"?>
+<p:sld xmlns:a="http://schemas.openxmlformats.org/drawingml/2006/main" xmlns:r="http://schemas.openxmlformats.org/officeDocument/2006/relationships" xmlns:p="http://schemas.openxmlformats.org/presentationml/2006/main">
+  <p:cSld>
+    <p:spTree>
+      <p:nvGrpSpPr>
+        <p:cNvPr id="1" name=""/>
+        <p:cNvGrpSpPr/>
+        <p:nvPr/>
+      </p:nvGrpSpPr>
+      <p:grpSpPr>
+        <a:xfrm>
+          <a:off x="0" y="0"/>
+          <a:ext cx="0" cy="0"/>
+          <a:chOff x="0" y="0"/>
+          <a:chExt cx="0" cy="0"/>
+        </a:xfrm>
+      </p:grpSpPr>
+      <p:sp>
+        <p:nvSpPr>
+          <p:cNvPr id="2" name="Title 1"/>
+          <p:cNvSpPr>
+            <a:spLocks noGrp="1"/>
+          </p:cNvSpPr>
+          <p:nvPr>
+            <p:ph type="title"/>
+          </p:nvPr>
+        </p:nvSpPr>
+        <p:spPr/>
+        <p:txBody>
+          <a:bodyPr/>
+          <a:lstStyle/>
+          <a:p>
+            <a:r>
+              <a:rPr lang="he-IL" dirty="0" smtClean="0"/>
               <a:t>הקדמה</a:t>
             </a:r>
             <a:endParaRPr lang="en-US" dirty="0"/>
@@ -5420,7 +6003,7 @@
 </p:sld>
 </file>
 
-<file path=ppt/slides/slide3.xml><?xml version="1.0" encoding="utf-8"?>
+<file path=ppt/slides/slide4.xml><?xml version="1.0" encoding="utf-8"?>
 <p:sld xmlns:a="http://schemas.openxmlformats.org/drawingml/2006/main" xmlns:r="http://schemas.openxmlformats.org/officeDocument/2006/relationships" xmlns:p="http://schemas.openxmlformats.org/presentationml/2006/main">
   <p:cSld>
     <p:spTree>
@@ -5703,7 +6286,7 @@
 </p:sld>
 </file>
 
-<file path=ppt/slides/slide4.xml><?xml version="1.0" encoding="utf-8"?>
+<file path=ppt/slides/slide5.xml><?xml version="1.0" encoding="utf-8"?>
 <p:sld xmlns:a="http://schemas.openxmlformats.org/drawingml/2006/main" xmlns:r="http://schemas.openxmlformats.org/officeDocument/2006/relationships" xmlns:p="http://schemas.openxmlformats.org/presentationml/2006/main">
   <p:cSld>
     <p:spTree>
@@ -6126,7 +6709,7 @@
 </p:sld>
 </file>
 
-<file path=ppt/slides/slide5.xml><?xml version="1.0" encoding="utf-8"?>
+<file path=ppt/slides/slide6.xml><?xml version="1.0" encoding="utf-8"?>
 <p:sld xmlns:a="http://schemas.openxmlformats.org/drawingml/2006/main" xmlns:r="http://schemas.openxmlformats.org/officeDocument/2006/relationships" xmlns:p="http://schemas.openxmlformats.org/presentationml/2006/main">
   <p:cSld>
     <p:spTree>
@@ -6406,7 +6989,7 @@
 </p:sld>
 </file>
 
-<file path=ppt/slides/slide6.xml><?xml version="1.0" encoding="utf-8"?>
+<file path=ppt/slides/slide7.xml><?xml version="1.0" encoding="utf-8"?>
 <p:sld xmlns:a="http://schemas.openxmlformats.org/drawingml/2006/main" xmlns:r="http://schemas.openxmlformats.org/officeDocument/2006/relationships" xmlns:p="http://schemas.openxmlformats.org/presentationml/2006/main">
   <p:cSld>
     <p:spTree>
@@ -6529,7 +7112,7 @@
 </p:sld>
 </file>
 
-<file path=ppt/slides/slide7.xml><?xml version="1.0" encoding="utf-8"?>
+<file path=ppt/slides/slide8.xml><?xml version="1.0" encoding="utf-8"?>
 <p:sld xmlns:a="http://schemas.openxmlformats.org/drawingml/2006/main" xmlns:r="http://schemas.openxmlformats.org/officeDocument/2006/relationships" xmlns:p="http://schemas.openxmlformats.org/presentationml/2006/main">
   <p:cSld>
     <p:spTree>
@@ -6773,114 +7356,6 @@
 </p:sld>
 </file>
 
-<file path=ppt/slides/slide8.xml><?xml version="1.0" encoding="utf-8"?>
-<p:sld xmlns:a="http://schemas.openxmlformats.org/drawingml/2006/main" xmlns:r="http://schemas.openxmlformats.org/officeDocument/2006/relationships" xmlns:p="http://schemas.openxmlformats.org/presentationml/2006/main">
-  <p:cSld>
-    <p:spTree>
-      <p:nvGrpSpPr>
-        <p:cNvPr id="1" name=""/>
-        <p:cNvGrpSpPr/>
-        <p:nvPr/>
-      </p:nvGrpSpPr>
-      <p:grpSpPr>
-        <a:xfrm>
-          <a:off x="0" y="0"/>
-          <a:ext cx="0" cy="0"/>
-          <a:chOff x="0" y="0"/>
-          <a:chExt cx="0" cy="0"/>
-        </a:xfrm>
-      </p:grpSpPr>
-      <p:sp>
-        <p:nvSpPr>
-          <p:cNvPr id="2" name="Title 1"/>
-          <p:cNvSpPr>
-            <a:spLocks noGrp="1"/>
-          </p:cNvSpPr>
-          <p:nvPr>
-            <p:ph type="title"/>
-          </p:nvPr>
-        </p:nvSpPr>
-        <p:spPr/>
-        <p:txBody>
-          <a:bodyPr/>
-          <a:lstStyle/>
-          <a:p>
-            <a:r>
-              <a:rPr lang="en-US" dirty="0" smtClean="0"/>
-              <a:t>11.2.5 Indices on Multiple Keys</a:t>
-            </a:r>
-            <a:endParaRPr lang="en-US" dirty="0"/>
-          </a:p>
-        </p:txBody>
-      </p:sp>
-      <p:sp>
-        <p:nvSpPr>
-          <p:cNvPr id="3" name="Content Placeholder 2"/>
-          <p:cNvSpPr>
-            <a:spLocks noGrp="1"/>
-          </p:cNvSpPr>
-          <p:nvPr>
-            <p:ph idx="1"/>
-          </p:nvPr>
-        </p:nvSpPr>
-        <p:spPr/>
-        <p:txBody>
-          <a:bodyPr>
-            <a:normAutofit/>
-          </a:bodyPr>
-          <a:lstStyle/>
-          <a:p>
-            <a:r>
-              <a:rPr lang="en-US" sz="2400" dirty="0" smtClean="0"/>
-              <a:t>a search key can have more than one attribute.</a:t>
-            </a:r>
-          </a:p>
-          <a:p>
-            <a:r>
-              <a:rPr lang="en-US" sz="2400" dirty="0" smtClean="0"/>
-              <a:t>A search key containing more than one attribute is referred to as a </a:t>
-            </a:r>
-            <a:r>
-              <a:rPr lang="en-US" sz="2400" dirty="0" smtClean="0">
-                <a:solidFill>
-                  <a:srgbClr val="00B0F0"/>
-                </a:solidFill>
-              </a:rPr>
-              <a:t>composite search key</a:t>
-            </a:r>
-            <a:r>
-              <a:rPr lang="en-US" sz="2400" dirty="0" smtClean="0"/>
-              <a:t>.</a:t>
-            </a:r>
-          </a:p>
-          <a:p>
-            <a:r>
-              <a:rPr lang="en-US" sz="2400" dirty="0" smtClean="0"/>
-              <a:t>The search key can be represented as a tuple of values</a:t>
-            </a:r>
-          </a:p>
-          <a:p>
-            <a:r>
-              <a:rPr lang="en-US" sz="2000" dirty="0" smtClean="0"/>
-              <a:t>The ordering of search-key values is the lexicographic ordering.</a:t>
-            </a:r>
-            <a:endParaRPr lang="en-US" sz="2000" dirty="0"/>
-          </a:p>
-        </p:txBody>
-      </p:sp>
-    </p:spTree>
-    <p:extLst>
-      <p:ext uri="{BB962C8B-B14F-4D97-AF65-F5344CB8AC3E}">
-        <p14:creationId xmlns:p14="http://schemas.microsoft.com/office/powerpoint/2010/main" val="260830686"/>
-      </p:ext>
-    </p:extLst>
-  </p:cSld>
-  <p:clrMapOvr>
-    <a:masterClrMapping/>
-  </p:clrMapOvr>
-</p:sld>
-</file>
-
 <file path=ppt/slides/slide9.xml><?xml version="1.0" encoding="utf-8"?>
 <p:sld xmlns:a="http://schemas.openxmlformats.org/drawingml/2006/main" xmlns:r="http://schemas.openxmlformats.org/officeDocument/2006/relationships" xmlns:p="http://schemas.openxmlformats.org/presentationml/2006/main">
   <p:cSld>
@@ -6915,7 +7390,7 @@
           <a:p>
             <a:r>
               <a:rPr lang="en-US" dirty="0" smtClean="0"/>
-              <a:t>11.3 B+-Tree Index Files</a:t>
+              <a:t>11.2.5 Indices on Multiple Keys</a:t>
             </a:r>
             <a:endParaRPr lang="en-US" dirty="0"/>
           </a:p>
@@ -6938,224 +7413,48 @@
           </a:bodyPr>
           <a:lstStyle/>
           <a:p>
-            <a:pPr algn="r" rtl="1"/>
-            <a:r>
-              <a:rPr lang="he-IL" sz="1600" dirty="0" smtClean="0"/>
-              <a:t>החסרון של </a:t>
-            </a:r>
-            <a:r>
-              <a:rPr lang="en-US" sz="1600" dirty="0" smtClean="0"/>
-              <a:t>index-sequential file </a:t>
-            </a:r>
-            <a:r>
-              <a:rPr lang="he-IL" sz="1600" dirty="0" smtClean="0"/>
-              <a:t> הוא שככל ה</a:t>
-            </a:r>
-            <a:r>
-              <a:rPr lang="en-US" sz="1600" dirty="0" smtClean="0"/>
-              <a:t>data </a:t>
-            </a:r>
-            <a:r>
-              <a:rPr lang="he-IL" sz="1600" dirty="0" smtClean="0"/>
-              <a:t> גדול יותר הביצוע לשאילתה חזרה איטי יותר</a:t>
-            </a:r>
-          </a:p>
-          <a:p>
-            <a:pPr algn="r" rtl="1"/>
-            <a:r>
-              <a:rPr lang="he-IL" sz="1600" dirty="0" smtClean="0"/>
-              <a:t> </a:t>
-            </a:r>
-            <a:r>
-              <a:rPr lang="en-US" sz="1600" dirty="0" smtClean="0">
+            <a:r>
+              <a:rPr lang="en-US" sz="2400" dirty="0" smtClean="0"/>
+              <a:t>a search key can have more than one attribute.</a:t>
+            </a:r>
+          </a:p>
+          <a:p>
+            <a:r>
+              <a:rPr lang="en-US" sz="2400" dirty="0" smtClean="0"/>
+              <a:t>A search key containing more than one attribute is referred to as a </a:t>
+            </a:r>
+            <a:r>
+              <a:rPr lang="en-US" sz="2400" dirty="0" smtClean="0">
                 <a:solidFill>
                   <a:srgbClr val="00B0F0"/>
                 </a:solidFill>
               </a:rPr>
-              <a:t>B+-tree </a:t>
-            </a:r>
-            <a:r>
-              <a:rPr lang="en-US" sz="1600" dirty="0" smtClean="0"/>
-              <a:t>index structure</a:t>
-            </a:r>
-            <a:r>
-              <a:rPr lang="he-IL" sz="1600" dirty="0" smtClean="0"/>
-              <a:t> הוא הנפוץ ביותר (</a:t>
-            </a:r>
-            <a:r>
-              <a:rPr lang="en-US" sz="1600" dirty="0" smtClean="0"/>
-              <a:t> balance search tree</a:t>
-            </a:r>
-            <a:r>
-              <a:rPr lang="he-IL" sz="1600" dirty="0" smtClean="0"/>
-              <a:t>)</a:t>
-            </a:r>
-          </a:p>
-          <a:p>
-            <a:pPr algn="r" rtl="1"/>
-            <a:r>
-              <a:rPr lang="en-US" sz="1600" dirty="0" smtClean="0"/>
-              <a:t>Good place to see quick tutorial on balance search tree is you tube</a:t>
-            </a:r>
-          </a:p>
-          <a:p>
-            <a:pPr algn="r" rtl="1"/>
-            <a:r>
-              <a:rPr lang="en-US" sz="1050" dirty="0" smtClean="0">
-                <a:hlinkClick r:id="rId2"/>
-              </a:rPr>
-              <a:t>https://www.youtube.com/watch?v=R1w_kICRI3g</a:t>
-            </a:r>
-            <a:r>
-              <a:rPr lang="he-IL" sz="1050" dirty="0"/>
-              <a:t> </a:t>
-            </a:r>
-            <a:r>
-              <a:rPr lang="he-IL" sz="1050" dirty="0" smtClean="0"/>
-              <a:t>, </a:t>
-            </a:r>
-            <a:r>
-              <a:rPr lang="en-US" sz="1050" dirty="0" smtClean="0">
-                <a:hlinkClick r:id="rId3"/>
-              </a:rPr>
-              <a:t>https://www.youtube.com/watch?v=RAgCa_IDCNQ</a:t>
-            </a:r>
-            <a:r>
-              <a:rPr lang="he-IL" sz="1050" dirty="0" smtClean="0"/>
-              <a:t> , </a:t>
-            </a:r>
-          </a:p>
-          <a:p>
-            <a:pPr algn="l"/>
-            <a:r>
-              <a:rPr lang="en-US" sz="1600" dirty="0" smtClean="0"/>
-              <a:t>Within </a:t>
-            </a:r>
-            <a:r>
-              <a:rPr lang="en-US" sz="1600" dirty="0"/>
-              <a:t>a </a:t>
-            </a:r>
-            <a:r>
-              <a:rPr lang="en-US" sz="1600" dirty="0" err="1"/>
-              <a:t>B+tree</a:t>
-            </a:r>
-            <a:r>
-              <a:rPr lang="en-US" sz="1600" dirty="0"/>
-              <a:t> all leaf nodes are linked together in a linked-listed, left to right, and since the values at the leaf nodes are sorted, so range lookups are very efficient</a:t>
-            </a:r>
-            <a:r>
-              <a:rPr lang="en-US" sz="1600" dirty="0" smtClean="0"/>
+              <a:t>composite search key</a:t>
+            </a:r>
+            <a:r>
+              <a:rPr lang="en-US" sz="2400" dirty="0" smtClean="0"/>
               <a:t>.</a:t>
             </a:r>
           </a:p>
           <a:p>
-            <a:pPr marL="0" indent="0">
-              <a:buNone/>
-            </a:pPr>
+            <a:r>
+              <a:rPr lang="en-US" sz="2400" dirty="0" smtClean="0"/>
+              <a:t>The search key can be represented as a tuple of values</a:t>
+            </a:r>
+          </a:p>
+          <a:p>
             <a:r>
               <a:rPr lang="en-US" sz="2000" dirty="0" smtClean="0"/>
-              <a:t> </a:t>
-            </a:r>
-          </a:p>
-          <a:p>
-            <a:r>
-              <a:rPr lang="en-US" sz="2000" dirty="0" smtClean="0"/>
-              <a:t>Each leaf can hold up to n − 1</a:t>
-            </a:r>
-          </a:p>
-          <a:p>
-            <a:r>
-              <a:rPr lang="en-US" sz="2000" dirty="0" smtClean="0"/>
-              <a:t>We allow leaf nodes to contain as few as (n − 1)/2 values.</a:t>
-            </a:r>
-          </a:p>
-          <a:p>
-            <a:pPr marL="0" indent="0">
-              <a:buNone/>
-            </a:pPr>
-            <a:r>
-              <a:rPr lang="en-US" sz="2000" dirty="0" smtClean="0"/>
-              <a:t>   This is how a node looks like, n pointers and n-1 keys</a:t>
-            </a:r>
-          </a:p>
-          <a:p>
-            <a:pPr algn="l"/>
-            <a:endParaRPr lang="he-IL" sz="1050" dirty="0" smtClean="0"/>
-          </a:p>
-          <a:p>
-            <a:pPr algn="r" rtl="1"/>
-            <a:endParaRPr lang="en-US" sz="1600" dirty="0"/>
-          </a:p>
-        </p:txBody>
-      </p:sp>
-      <p:pic>
-        <p:nvPicPr>
-          <p:cNvPr id="4" name="Picture 3"/>
-          <p:cNvPicPr>
-            <a:picLocks noChangeAspect="1" noChangeArrowheads="1"/>
-          </p:cNvPicPr>
-          <p:nvPr/>
-        </p:nvPicPr>
-        <p:blipFill>
-          <a:blip r:embed="rId4">
-            <a:extLst>
-              <a:ext uri="{28A0092B-C50C-407E-A947-70E740481C1C}">
-                <a14:useLocalDpi xmlns:a14="http://schemas.microsoft.com/office/drawing/2010/main" val="0"/>
-              </a:ext>
-            </a:extLst>
-          </a:blip>
-          <a:srcRect/>
-          <a:stretch>
-            <a:fillRect/>
-          </a:stretch>
-        </p:blipFill>
-        <p:spPr bwMode="auto">
-          <a:xfrm>
-            <a:off x="457200" y="5029200"/>
-            <a:ext cx="4876800" cy="962025"/>
-          </a:xfrm>
-          <a:prstGeom prst="rect">
-            <a:avLst/>
-          </a:prstGeom>
-          <a:noFill/>
-          <a:ln>
-            <a:noFill/>
-          </a:ln>
-          <a:effectLst/>
-          <a:extLst>
-            <a:ext uri="{909E8E84-426E-40DD-AFC4-6F175D3DCCD1}">
-              <a14:hiddenFill xmlns:a14="http://schemas.microsoft.com/office/drawing/2010/main">
-                <a:solidFill>
-                  <a:schemeClr val="accent1"/>
-                </a:solidFill>
-              </a14:hiddenFill>
-            </a:ext>
-            <a:ext uri="{91240B29-F687-4F45-9708-019B960494DF}">
-              <a14:hiddenLine xmlns:a14="http://schemas.microsoft.com/office/drawing/2010/main" w="9525">
-                <a:solidFill>
-                  <a:schemeClr val="tx1"/>
-                </a:solidFill>
-                <a:miter lim="800000"/>
-                <a:headEnd/>
-                <a:tailEnd/>
-              </a14:hiddenLine>
-            </a:ext>
-            <a:ext uri="{AF507438-7753-43E0-B8FC-AC1667EBCBE1}">
-              <a14:hiddenEffects xmlns:a14="http://schemas.microsoft.com/office/drawing/2010/main">
-                <a:effectLst>
-                  <a:outerShdw dist="35921" dir="2700000" algn="ctr" rotWithShape="0">
-                    <a:schemeClr val="bg2"/>
-                  </a:outerShdw>
-                </a:effectLst>
-              </a14:hiddenEffects>
-            </a:ext>
-          </a:extLst>
-        </p:spPr>
-      </p:pic>
+              <a:t>The ordering of search-key values is the lexicographic ordering.</a:t>
+            </a:r>
+            <a:endParaRPr lang="en-US" sz="2000" dirty="0"/>
+          </a:p>
+        </p:txBody>
+      </p:sp>
     </p:spTree>
     <p:extLst>
       <p:ext uri="{BB962C8B-B14F-4D97-AF65-F5344CB8AC3E}">
-        <p14:creationId xmlns:p14="http://schemas.microsoft.com/office/powerpoint/2010/main" val="4214298886"/>
+        <p14:creationId xmlns:p14="http://schemas.microsoft.com/office/powerpoint/2010/main" val="260830686"/>
       </p:ext>
     </p:extLst>
   </p:cSld>

</xml_diff>